<commit_message>
Clean up Divide and Conquer slides
</commit_message>
<xml_diff>
--- a/5_presentations/DivideAndConquer.pptx
+++ b/5_presentations/DivideAndConquer.pptx
@@ -12,7 +12,7 @@
     <p:sldId id="256" r:id="rId3"/>
     <p:sldId id="1574" r:id="rId4"/>
     <p:sldId id="1627" r:id="rId5"/>
-    <p:sldId id="1628" r:id="rId6"/>
+    <p:sldId id="1639" r:id="rId6"/>
     <p:sldId id="1624" r:id="rId7"/>
     <p:sldId id="1629" r:id="rId8"/>
     <p:sldId id="1630" r:id="rId9"/>
@@ -212,7 +212,7 @@
           <a:p>
             <a:fld id="{354D3AFA-F451-444D-BAEC-38D955773079}" type="datetimeFigureOut">
               <a:rPr lang="en-US" smtClean="0"/>
-              <a:t>1/5/2020</a:t>
+              <a:t>1/6/2020</a:t>
             </a:fld>
             <a:endParaRPr lang="en-US"/>
           </a:p>
@@ -722,7 +722,7 @@
                 <a:tabLst/>
                 <a:defRPr/>
               </a:pPr>
-              <a:t>1/5/2020 10:06 AM</a:t>
+              <a:t>1/6/2020 8:33 PM</a:t>
             </a:fld>
             <a:endParaRPr kumimoji="0" lang="en-US" sz="1200" b="0" i="0" u="none" strike="noStrike" kern="1200" cap="none" spc="0" normalizeH="0" baseline="0" noProof="0" dirty="0">
               <a:ln>
@@ -1080,7 +1080,7 @@
                 <a:tabLst/>
                 <a:defRPr/>
               </a:pPr>
-              <a:t>1/5/2020 10:47 AM</a:t>
+              <a:t>1/6/2020 8:33 PM</a:t>
             </a:fld>
             <a:endParaRPr kumimoji="0" lang="en-US" sz="1200" b="0" i="0" u="none" strike="noStrike" kern="1200" cap="none" spc="0" normalizeH="0" baseline="0" noProof="0" dirty="0">
               <a:ln>
@@ -1438,7 +1438,7 @@
                 <a:tabLst/>
                 <a:defRPr/>
               </a:pPr>
-              <a:t>1/5/2020 10:59 AM</a:t>
+              <a:t>1/6/2020 8:33 PM</a:t>
             </a:fld>
             <a:endParaRPr kumimoji="0" lang="en-US" sz="1200" b="0" i="0" u="none" strike="noStrike" kern="1200" cap="none" spc="0" normalizeH="0" baseline="0" noProof="0" dirty="0">
               <a:ln>
@@ -1796,7 +1796,7 @@
                 <a:tabLst/>
                 <a:defRPr/>
               </a:pPr>
-              <a:t>1/5/2020 11:03 AM</a:t>
+              <a:t>1/6/2020 8:33 PM</a:t>
             </a:fld>
             <a:endParaRPr kumimoji="0" lang="en-US" sz="1200" b="0" i="0" u="none" strike="noStrike" kern="1200" cap="none" spc="0" normalizeH="0" baseline="0" noProof="0" dirty="0">
               <a:ln>
@@ -2154,7 +2154,7 @@
                 <a:tabLst/>
                 <a:defRPr/>
               </a:pPr>
-              <a:t>1/5/2020 10:39 AM</a:t>
+              <a:t>1/6/2020 8:33 PM</a:t>
             </a:fld>
             <a:endParaRPr kumimoji="0" lang="en-US" sz="1200" b="0" i="0" u="none" strike="noStrike" kern="1200" cap="none" spc="0" normalizeH="0" baseline="0" noProof="0" dirty="0">
               <a:ln>
@@ -2445,7 +2445,7 @@
                 <a:tabLst/>
                 <a:defRPr/>
               </a:pPr>
-              <a:t>1/5/2020 9:59 AM</a:t>
+              <a:t>1/6/2020 8:33 PM</a:t>
             </a:fld>
             <a:endParaRPr kumimoji="0" lang="en-US" sz="1200" b="0" i="0" u="none" strike="noStrike" kern="1200" cap="none" spc="0" normalizeH="0" baseline="0" noProof="0" dirty="0">
               <a:ln>
@@ -2885,7 +2885,7 @@
                 <a:tabLst/>
                 <a:defRPr/>
               </a:pPr>
-              <a:t>1/5/2020 10:07 AM</a:t>
+              <a:t>1/6/2020 8:33 PM</a:t>
             </a:fld>
             <a:endParaRPr kumimoji="0" lang="en-US" sz="1200" b="0" i="0" u="none" strike="noStrike" kern="1200" cap="none" spc="0" normalizeH="0" baseline="0" noProof="0" dirty="0">
               <a:ln>
@@ -3243,7 +3243,7 @@
                 <a:tabLst/>
                 <a:defRPr/>
               </a:pPr>
-              <a:t>1/5/2020 9:59 AM</a:t>
+              <a:t>1/6/2020 8:35 PM</a:t>
             </a:fld>
             <a:endParaRPr kumimoji="0" lang="en-US" sz="1200" b="0" i="0" u="none" strike="noStrike" kern="1200" cap="none" spc="0" normalizeH="0" baseline="0" noProof="0" dirty="0">
               <a:ln>
@@ -3348,7 +3348,7 @@
     </p:spTree>
     <p:extLst>
       <p:ext uri="{BB962C8B-B14F-4D97-AF65-F5344CB8AC3E}">
-        <p14:creationId xmlns:p14="http://schemas.microsoft.com/office/powerpoint/2010/main" val="2477081053"/>
+        <p14:creationId xmlns:p14="http://schemas.microsoft.com/office/powerpoint/2010/main" val="1505614825"/>
       </p:ext>
     </p:extLst>
   </p:cSld>
@@ -3601,7 +3601,7 @@
                 <a:tabLst/>
                 <a:defRPr/>
               </a:pPr>
-              <a:t>1/5/2020 9:59 AM</a:t>
+              <a:t>1/6/2020 8:33 PM</a:t>
             </a:fld>
             <a:endParaRPr kumimoji="0" lang="en-US" sz="1200" b="0" i="0" u="none" strike="noStrike" kern="1200" cap="none" spc="0" normalizeH="0" baseline="0" noProof="0" dirty="0">
               <a:ln>
@@ -3959,7 +3959,7 @@
                 <a:tabLst/>
                 <a:defRPr/>
               </a:pPr>
-              <a:t>1/5/2020 10:15 AM</a:t>
+              <a:t>1/6/2020 8:33 PM</a:t>
             </a:fld>
             <a:endParaRPr kumimoji="0" lang="en-US" sz="1200" b="0" i="0" u="none" strike="noStrike" kern="1200" cap="none" spc="0" normalizeH="0" baseline="0" noProof="0" dirty="0">
               <a:ln>
@@ -4317,7 +4317,7 @@
                 <a:tabLst/>
                 <a:defRPr/>
               </a:pPr>
-              <a:t>1/5/2020 10:23 AM</a:t>
+              <a:t>1/6/2020 8:33 PM</a:t>
             </a:fld>
             <a:endParaRPr kumimoji="0" lang="en-US" sz="1200" b="0" i="0" u="none" strike="noStrike" kern="1200" cap="none" spc="0" normalizeH="0" baseline="0" noProof="0" dirty="0">
               <a:ln>
@@ -4675,7 +4675,7 @@
                 <a:tabLst/>
                 <a:defRPr/>
               </a:pPr>
-              <a:t>1/5/2020 10:27 AM</a:t>
+              <a:t>1/6/2020 8:33 PM</a:t>
             </a:fld>
             <a:endParaRPr kumimoji="0" lang="en-US" sz="1200" b="0" i="0" u="none" strike="noStrike" kern="1200" cap="none" spc="0" normalizeH="0" baseline="0" noProof="0" dirty="0">
               <a:ln>
@@ -5033,7 +5033,7 @@
                 <a:tabLst/>
                 <a:defRPr/>
               </a:pPr>
-              <a:t>1/5/2020 10:31 AM</a:t>
+              <a:t>1/6/2020 8:33 PM</a:t>
             </a:fld>
             <a:endParaRPr kumimoji="0" lang="en-US" sz="1200" b="0" i="0" u="none" strike="noStrike" kern="1200" cap="none" spc="0" normalizeH="0" baseline="0" noProof="0" dirty="0">
               <a:ln>
@@ -5391,7 +5391,7 @@
                 <a:tabLst/>
                 <a:defRPr/>
               </a:pPr>
-              <a:t>1/5/2020 10:29 AM</a:t>
+              <a:t>1/6/2020 8:33 PM</a:t>
             </a:fld>
             <a:endParaRPr kumimoji="0" lang="en-US" sz="1200" b="0" i="0" u="none" strike="noStrike" kern="1200" cap="none" spc="0" normalizeH="0" baseline="0" noProof="0" dirty="0">
               <a:ln>
@@ -5653,7 +5653,7 @@
           <a:p>
             <a:fld id="{DFA8C626-DCFC-44B9-B53F-E89648D7BB7E}" type="datetimeFigureOut">
               <a:rPr lang="en-US" smtClean="0"/>
-              <a:t>1/5/2020</a:t>
+              <a:t>1/6/2020</a:t>
             </a:fld>
             <a:endParaRPr lang="en-US"/>
           </a:p>
@@ -5851,7 +5851,7 @@
           <a:p>
             <a:fld id="{DFA8C626-DCFC-44B9-B53F-E89648D7BB7E}" type="datetimeFigureOut">
               <a:rPr lang="en-US" smtClean="0"/>
-              <a:t>1/5/2020</a:t>
+              <a:t>1/6/2020</a:t>
             </a:fld>
             <a:endParaRPr lang="en-US"/>
           </a:p>
@@ -6059,7 +6059,7 @@
           <a:p>
             <a:fld id="{DFA8C626-DCFC-44B9-B53F-E89648D7BB7E}" type="datetimeFigureOut">
               <a:rPr lang="en-US" smtClean="0"/>
-              <a:t>1/5/2020</a:t>
+              <a:t>1/6/2020</a:t>
             </a:fld>
             <a:endParaRPr lang="en-US"/>
           </a:p>
@@ -8072,7 +8072,7 @@
           <a:p>
             <a:fld id="{DFA8C626-DCFC-44B9-B53F-E89648D7BB7E}" type="datetimeFigureOut">
               <a:rPr lang="en-US" smtClean="0"/>
-              <a:t>1/5/2020</a:t>
+              <a:t>1/6/2020</a:t>
             </a:fld>
             <a:endParaRPr lang="en-US"/>
           </a:p>
@@ -9790,7 +9790,7 @@
           <a:p>
             <a:fld id="{DFA8C626-DCFC-44B9-B53F-E89648D7BB7E}" type="datetimeFigureOut">
               <a:rPr lang="en-US" smtClean="0"/>
-              <a:t>1/5/2020</a:t>
+              <a:t>1/6/2020</a:t>
             </a:fld>
             <a:endParaRPr lang="en-US"/>
           </a:p>
@@ -10055,7 +10055,7 @@
           <a:p>
             <a:fld id="{DFA8C626-DCFC-44B9-B53F-E89648D7BB7E}" type="datetimeFigureOut">
               <a:rPr lang="en-US" smtClean="0"/>
-              <a:t>1/5/2020</a:t>
+              <a:t>1/6/2020</a:t>
             </a:fld>
             <a:endParaRPr lang="en-US"/>
           </a:p>
@@ -10467,7 +10467,7 @@
           <a:p>
             <a:fld id="{DFA8C626-DCFC-44B9-B53F-E89648D7BB7E}" type="datetimeFigureOut">
               <a:rPr lang="en-US" smtClean="0"/>
-              <a:t>1/5/2020</a:t>
+              <a:t>1/6/2020</a:t>
             </a:fld>
             <a:endParaRPr lang="en-US"/>
           </a:p>
@@ -10608,7 +10608,7 @@
           <a:p>
             <a:fld id="{DFA8C626-DCFC-44B9-B53F-E89648D7BB7E}" type="datetimeFigureOut">
               <a:rPr lang="en-US" smtClean="0"/>
-              <a:t>1/5/2020</a:t>
+              <a:t>1/6/2020</a:t>
             </a:fld>
             <a:endParaRPr lang="en-US"/>
           </a:p>
@@ -10721,7 +10721,7 @@
           <a:p>
             <a:fld id="{DFA8C626-DCFC-44B9-B53F-E89648D7BB7E}" type="datetimeFigureOut">
               <a:rPr lang="en-US" smtClean="0"/>
-              <a:t>1/5/2020</a:t>
+              <a:t>1/6/2020</a:t>
             </a:fld>
             <a:endParaRPr lang="en-US"/>
           </a:p>
@@ -11032,7 +11032,7 @@
           <a:p>
             <a:fld id="{DFA8C626-DCFC-44B9-B53F-E89648D7BB7E}" type="datetimeFigureOut">
               <a:rPr lang="en-US" smtClean="0"/>
-              <a:t>1/5/2020</a:t>
+              <a:t>1/6/2020</a:t>
             </a:fld>
             <a:endParaRPr lang="en-US"/>
           </a:p>
@@ -11320,7 +11320,7 @@
           <a:p>
             <a:fld id="{DFA8C626-DCFC-44B9-B53F-E89648D7BB7E}" type="datetimeFigureOut">
               <a:rPr lang="en-US" smtClean="0"/>
-              <a:t>1/5/2020</a:t>
+              <a:t>1/6/2020</a:t>
             </a:fld>
             <a:endParaRPr lang="en-US"/>
           </a:p>
@@ -11561,7 +11561,7 @@
           <a:p>
             <a:fld id="{DFA8C626-DCFC-44B9-B53F-E89648D7BB7E}" type="datetimeFigureOut">
               <a:rPr lang="en-US" smtClean="0"/>
-              <a:t>1/5/2020</a:t>
+              <a:t>1/6/2020</a:t>
             </a:fld>
             <a:endParaRPr lang="en-US"/>
           </a:p>
@@ -12840,7 +12840,7 @@
           <a:p>
             <a:r>
               <a:rPr lang="en-US" dirty="0"/>
-              <a:t>P2: War Overview</a:t>
+              <a:t>P4: War</a:t>
             </a:r>
           </a:p>
         </p:txBody>
@@ -12860,7 +12860,7 @@
         <p:spPr>
           <a:xfrm>
             <a:off x="624625" y="1423721"/>
-            <a:ext cx="10550556" cy="5016758"/>
+            <a:ext cx="10550556" cy="5509200"/>
           </a:xfrm>
           <a:prstGeom prst="rect">
             <a:avLst/>
@@ -12905,7 +12905,7 @@
                 <a:ea typeface="+mn-ea"/>
                 <a:cs typeface="+mn-cs"/>
               </a:rPr>
-              <a:t>A “War” occurs when during Standard Play, the two players flip a card with the same face value. This is the most complex part of the game. </a:t>
+              <a:t>The war part is the most complicated part of this program. We saved this for last because by doing the other parts we are almost done!</a:t>
             </a:r>
           </a:p>
           <a:p>
@@ -12986,7 +12986,39 @@
                 </a:solidFill>
                 <a:latin typeface="Calibri" panose="020F0502020204030204"/>
               </a:rPr>
-              <a:t>Each player places 1 (or more) cards face down and finally flips another one. If the flip cards are again a tie, replay this step.</a:t>
+              <a:t>Each player places 1 (or more) cards face down and finally flips another one. </a:t>
+            </a:r>
+          </a:p>
+          <a:p>
+            <a:pPr marL="971550" lvl="1" indent="-514350">
+              <a:buFont typeface="Arial" panose="020B0604020202020204" pitchFamily="34" charset="0"/>
+              <a:buChar char="•"/>
+              <a:defRPr/>
+            </a:pPr>
+            <a:r>
+              <a:rPr lang="en-US" sz="3200" dirty="0">
+                <a:solidFill>
+                  <a:prstClr val="white"/>
+                </a:solidFill>
+                <a:latin typeface="Calibri" panose="020F0502020204030204"/>
+              </a:rPr>
+              <a:t>Cards are a tie, redo step 2</a:t>
+            </a:r>
+          </a:p>
+          <a:p>
+            <a:pPr marL="971550" lvl="1" indent="-514350">
+              <a:buFont typeface="Arial" panose="020B0604020202020204" pitchFamily="34" charset="0"/>
+              <a:buChar char="•"/>
+              <a:defRPr/>
+            </a:pPr>
+            <a:r>
+              <a:rPr lang="en-US" sz="3200" dirty="0">
+                <a:solidFill>
+                  <a:prstClr val="white"/>
+                </a:solidFill>
+                <a:latin typeface="Calibri" panose="020F0502020204030204"/>
+              </a:rPr>
+              <a:t>Cards are not a tie, go to step 3</a:t>
             </a:r>
           </a:p>
           <a:p>
@@ -13083,7 +13115,7 @@
           <a:p>
             <a:r>
               <a:rPr lang="en-US" dirty="0"/>
-              <a:t>P2: War Edge Case</a:t>
+              <a:t>P4: War Edge Case</a:t>
             </a:r>
           </a:p>
         </p:txBody>
@@ -13317,7 +13349,7 @@
               <a:defRPr/>
             </a:pPr>
             <a:r>
-              <a:rPr kumimoji="0" lang="en-US" sz="2800" b="0" i="0" u="none" strike="noStrike" kern="1200" cap="none" spc="0" normalizeH="0" baseline="0" noProof="0" dirty="0">
+              <a:rPr kumimoji="0" lang="en-US" sz="2800" b="1" i="1" u="none" strike="noStrike" kern="1200" cap="none" spc="0" normalizeH="0" baseline="0" noProof="0" dirty="0">
                 <a:ln>
                   <a:noFill/>
                 </a:ln>
@@ -13400,7 +13432,7 @@
           <a:p>
             <a:r>
               <a:rPr lang="en-US" dirty="0"/>
-              <a:t>P2: War Solution</a:t>
+              <a:t>P4: War Steps</a:t>
             </a:r>
           </a:p>
         </p:txBody>
@@ -13420,7 +13452,7 @@
         <p:spPr>
           <a:xfrm>
             <a:off x="624625" y="1423721"/>
-            <a:ext cx="10550556" cy="5293757"/>
+            <a:ext cx="10550556" cy="4493538"/>
           </a:xfrm>
           <a:prstGeom prst="rect">
             <a:avLst/>
@@ -13433,7 +13465,7 @@
           </a:bodyPr>
           <a:lstStyle/>
           <a:p>
-            <a:pPr marR="0" lvl="0" algn="l" defTabSz="914400" rtl="0" eaLnBrk="1" fontAlgn="auto" latinLnBrk="0" hangingPunct="1">
+            <a:pPr marL="514350" marR="0" lvl="0" indent="-514350" algn="l" defTabSz="914400" rtl="0" eaLnBrk="1" fontAlgn="auto" latinLnBrk="0" hangingPunct="1">
               <a:lnSpc>
                 <a:spcPct val="100000"/>
               </a:lnSpc>
@@ -13445,6 +13477,110 @@
               </a:spcAft>
               <a:buClrTx/>
               <a:buSzTx/>
+              <a:buFont typeface="+mj-lt"/>
+              <a:buAutoNum type="arabicPeriod"/>
+              <a:tabLst/>
+              <a:defRPr/>
+            </a:pPr>
+            <a:r>
+              <a:rPr lang="en-US" sz="2600" dirty="0">
+                <a:solidFill>
+                  <a:prstClr val="white"/>
+                </a:solidFill>
+                <a:latin typeface="Calibri" panose="020F0502020204030204"/>
+              </a:rPr>
+              <a:t>Create a </a:t>
+            </a:r>
+            <a:r>
+              <a:rPr lang="en-US" sz="2600" dirty="0" err="1">
+                <a:solidFill>
+                  <a:prstClr val="white"/>
+                </a:solidFill>
+                <a:latin typeface="Calibri" panose="020F0502020204030204"/>
+              </a:rPr>
+              <a:t>doWar</a:t>
+            </a:r>
+            <a:r>
+              <a:rPr lang="en-US" sz="2600" dirty="0">
+                <a:solidFill>
+                  <a:prstClr val="white"/>
+                </a:solidFill>
+                <a:latin typeface="Calibri" panose="020F0502020204030204"/>
+              </a:rPr>
+              <a:t>() function that receives the two player decks</a:t>
+            </a:r>
+          </a:p>
+          <a:p>
+            <a:pPr marL="514350" marR="0" lvl="0" indent="-514350" algn="l" defTabSz="914400" rtl="0" eaLnBrk="1" fontAlgn="auto" latinLnBrk="0" hangingPunct="1">
+              <a:lnSpc>
+                <a:spcPct val="100000"/>
+              </a:lnSpc>
+              <a:spcBef>
+                <a:spcPts val="0"/>
+              </a:spcBef>
+              <a:spcAft>
+                <a:spcPts val="0"/>
+              </a:spcAft>
+              <a:buClrTx/>
+              <a:buSzTx/>
+              <a:buFont typeface="+mj-lt"/>
+              <a:buAutoNum type="arabicPeriod"/>
+              <a:tabLst/>
+              <a:defRPr/>
+            </a:pPr>
+            <a:r>
+              <a:rPr lang="en-US" sz="2600" dirty="0">
+                <a:solidFill>
+                  <a:prstClr val="white"/>
+                </a:solidFill>
+                <a:latin typeface="Calibri" panose="020F0502020204030204"/>
+              </a:rPr>
+              <a:t>Create a list for all risk cards. </a:t>
+            </a:r>
+          </a:p>
+          <a:p>
+            <a:pPr marL="514350" marR="0" lvl="0" indent="-514350" algn="l" defTabSz="914400" rtl="0" eaLnBrk="1" fontAlgn="auto" latinLnBrk="0" hangingPunct="1">
+              <a:lnSpc>
+                <a:spcPct val="100000"/>
+              </a:lnSpc>
+              <a:spcBef>
+                <a:spcPts val="0"/>
+              </a:spcBef>
+              <a:spcAft>
+                <a:spcPts val="0"/>
+              </a:spcAft>
+              <a:buClrTx/>
+              <a:buSzTx/>
+              <a:buFont typeface="+mj-lt"/>
+              <a:buAutoNum type="arabicPeriod"/>
+              <a:tabLst/>
+              <a:defRPr/>
+            </a:pPr>
+            <a:r>
+              <a:rPr lang="en-US" sz="2600" dirty="0">
+                <a:solidFill>
+                  <a:prstClr val="white"/>
+                </a:solidFill>
+                <a:latin typeface="Calibri" panose="020F0502020204030204"/>
+              </a:rPr>
+              <a:t>If either player forfeits (new rule) add forfeit players cards to risk card list.</a:t>
+            </a:r>
+          </a:p>
+          <a:p>
+            <a:pPr marL="514350" marR="0" lvl="0" indent="-514350" algn="l" defTabSz="914400" rtl="0" eaLnBrk="1" fontAlgn="auto" latinLnBrk="0" hangingPunct="1">
+              <a:lnSpc>
+                <a:spcPct val="100000"/>
+              </a:lnSpc>
+              <a:spcBef>
+                <a:spcPts val="0"/>
+              </a:spcBef>
+              <a:spcAft>
+                <a:spcPts val="0"/>
+              </a:spcAft>
+              <a:buClrTx/>
+              <a:buSzTx/>
+              <a:buFont typeface="+mj-lt"/>
+              <a:buAutoNum type="arabicPeriod"/>
               <a:tabLst/>
               <a:defRPr/>
             </a:pPr>
@@ -13463,7 +13599,7 @@
                 <a:ea typeface="+mn-ea"/>
                 <a:cs typeface="+mn-cs"/>
               </a:rPr>
-              <a:t>A War can produce another war which means we have to call it again, so we will use a function. </a:t>
+              <a:t>Else, both players pop() 1 (or more) card and add to the risk cards list. </a:t>
             </a:r>
           </a:p>
           <a:p>
@@ -13491,35 +13627,7 @@
                 </a:solidFill>
                 <a:latin typeface="Calibri" panose="020F0502020204030204"/>
               </a:rPr>
-              <a:t>Create a list for all risk cards. </a:t>
-            </a:r>
-          </a:p>
-          <a:p>
-            <a:pPr marL="514350" marR="0" lvl="0" indent="-514350" algn="l" defTabSz="914400" rtl="0" eaLnBrk="1" fontAlgn="auto" latinLnBrk="0" hangingPunct="1">
-              <a:lnSpc>
-                <a:spcPct val="100000"/>
-              </a:lnSpc>
-              <a:spcBef>
-                <a:spcPts val="0"/>
-              </a:spcBef>
-              <a:spcAft>
-                <a:spcPts val="0"/>
-              </a:spcAft>
-              <a:buClrTx/>
-              <a:buSzTx/>
-              <a:buFont typeface="+mj-lt"/>
-              <a:buAutoNum type="arabicPeriod"/>
-              <a:tabLst/>
-              <a:defRPr/>
-            </a:pPr>
-            <a:r>
-              <a:rPr lang="en-US" sz="2600" dirty="0">
-                <a:solidFill>
-                  <a:prstClr val="white"/>
-                </a:solidFill>
-                <a:latin typeface="Calibri" panose="020F0502020204030204"/>
-              </a:rPr>
-              <a:t>If either player doesn’t have enough cards to play the war, add whatever cards they have to the risk card list.</a:t>
+              <a:t>Both players pop() 1 more as the flip card and add these to the risk pile. </a:t>
             </a:r>
           </a:p>
           <a:p>
@@ -13555,25 +13663,13 @@
                 <a:ea typeface="+mn-ea"/>
                 <a:cs typeface="+mn-cs"/>
               </a:rPr>
-              <a:t>Both players pop() 1 card and add to the risk cards list as face down cards. </a:t>
-            </a:r>
-          </a:p>
-          <a:p>
-            <a:pPr marL="514350" marR="0" lvl="0" indent="-514350" algn="l" defTabSz="914400" rtl="0" eaLnBrk="1" fontAlgn="auto" latinLnBrk="0" hangingPunct="1">
-              <a:lnSpc>
-                <a:spcPct val="100000"/>
-              </a:lnSpc>
-              <a:spcBef>
-                <a:spcPts val="0"/>
-              </a:spcBef>
-              <a:spcAft>
-                <a:spcPts val="0"/>
-              </a:spcAft>
-              <a:buClrTx/>
-              <a:buSzTx/>
-              <a:buFont typeface="+mj-lt"/>
-              <a:buAutoNum type="arabicPeriod"/>
-              <a:tabLst/>
+              <a:t>Compare the new flip cards:</a:t>
+            </a:r>
+          </a:p>
+          <a:p>
+            <a:pPr marL="971550" lvl="1" indent="-514350">
+              <a:buFont typeface="Arial" panose="020B0604020202020204" pitchFamily="34" charset="0"/>
+              <a:buChar char="•"/>
               <a:defRPr/>
             </a:pPr>
             <a:r>
@@ -13583,25 +13679,13 @@
                 </a:solidFill>
                 <a:latin typeface="Calibri" panose="020F0502020204030204"/>
               </a:rPr>
-              <a:t>Both players pop() 1 more as the face up card. Add these to the risk pile. </a:t>
-            </a:r>
-          </a:p>
-          <a:p>
-            <a:pPr marL="514350" marR="0" lvl="0" indent="-514350" algn="l" defTabSz="914400" rtl="0" eaLnBrk="1" fontAlgn="auto" latinLnBrk="0" hangingPunct="1">
-              <a:lnSpc>
-                <a:spcPct val="100000"/>
-              </a:lnSpc>
-              <a:spcBef>
-                <a:spcPts val="0"/>
-              </a:spcBef>
-              <a:spcAft>
-                <a:spcPts val="0"/>
-              </a:spcAft>
-              <a:buClrTx/>
-              <a:buSzTx/>
-              <a:buFont typeface="+mj-lt"/>
-              <a:buAutoNum type="arabicPeriod"/>
-              <a:tabLst/>
+              <a:t>Tie: Keeping the risk pile, start again at step 3. </a:t>
+            </a:r>
+          </a:p>
+          <a:p>
+            <a:pPr marL="971550" lvl="1" indent="-514350">
+              <a:buFont typeface="Arial" panose="020B0604020202020204" pitchFamily="34" charset="0"/>
+              <a:buChar char="•"/>
               <a:defRPr/>
             </a:pPr>
             <a:r>
@@ -13619,7 +13703,7 @@
                 <a:ea typeface="+mn-ea"/>
                 <a:cs typeface="+mn-cs"/>
               </a:rPr>
-              <a:t>If the flip cards again tie, recursively call the function and add the return risk cards to the original risk cards.</a:t>
+              <a:t>Non-Tie: go to step 7</a:t>
             </a:r>
           </a:p>
           <a:p>
@@ -13647,7 +13731,7 @@
                 </a:solidFill>
                 <a:latin typeface="Calibri" panose="020F0502020204030204"/>
               </a:rPr>
-              <a:t>Upon completion (one forfeits or there is a true winner) return all the results. P1 and P2 flip cards PLUS the risk list.</a:t>
+              <a:t>A player has won the war or one has forfeited. Return all the results. P1 and P2 flip cards PLUS the risk list.</a:t>
             </a:r>
           </a:p>
           <a:p>
@@ -13780,7 +13864,7 @@
         <p:spPr>
           <a:xfrm>
             <a:off x="624625" y="1423721"/>
-            <a:ext cx="10550556" cy="3693319"/>
+            <a:ext cx="10550556" cy="4832092"/>
           </a:xfrm>
           <a:prstGeom prst="rect">
             <a:avLst/>
@@ -13811,7 +13895,7 @@
               <a:defRPr/>
             </a:pPr>
             <a:r>
-              <a:rPr kumimoji="0" lang="en-US" sz="2600" b="0" i="0" u="none" strike="noStrike" kern="1200" cap="none" spc="0" normalizeH="0" baseline="0" noProof="0" dirty="0">
+              <a:rPr kumimoji="0" lang="en-US" sz="2800" b="0" i="0" u="none" strike="noStrike" kern="1200" cap="none" spc="0" normalizeH="0" baseline="0" noProof="0" dirty="0">
                 <a:ln>
                   <a:noFill/>
                 </a:ln>
@@ -13825,7 +13909,7 @@
                 <a:ea typeface="+mn-ea"/>
                 <a:cs typeface="+mn-cs"/>
               </a:rPr>
-              <a:t>We took the card game of war and first broke it down into 2 steps – Deck and Game Play. We then broke those steps down into smaller steps that are much simpler to solve. In fact we created 15 smaller steps in all</a:t>
+              <a:t>We took the card game of war and first broke it down into 4 problems. We then broke those problems down into 15 small steps that make the larger problem look fairly trivial. </a:t>
             </a:r>
           </a:p>
           <a:p>
@@ -13846,7 +13930,7 @@
               <a:tabLst/>
               <a:defRPr/>
             </a:pPr>
-            <a:endParaRPr lang="en-US" sz="2600" dirty="0">
+            <a:endParaRPr lang="en-US" sz="2800" dirty="0">
               <a:solidFill>
                 <a:prstClr val="white"/>
               </a:solidFill>
@@ -13872,7 +13956,7 @@
               <a:defRPr/>
             </a:pPr>
             <a:r>
-              <a:rPr kumimoji="0" lang="en-US" sz="2600" b="0" i="0" u="none" strike="noStrike" kern="1200" cap="none" spc="0" normalizeH="0" baseline="0" noProof="0" dirty="0">
+              <a:rPr kumimoji="0" lang="en-US" sz="2800" b="0" i="0" u="none" strike="noStrike" kern="1200" cap="none" spc="0" normalizeH="0" baseline="0" noProof="0" dirty="0">
                 <a:ln>
                   <a:noFill/>
                 </a:ln>
@@ -13886,7 +13970,7 @@
                 <a:ea typeface="+mn-ea"/>
                 <a:cs typeface="+mn-cs"/>
               </a:rPr>
-              <a:t>	Problem 1 : Deck was broken down into 3 steps</a:t>
+              <a:t>	Problem 1 : Deck was broken down into 3 coding steps</a:t>
             </a:r>
           </a:p>
           <a:p>
@@ -13908,13 +13992,13 @@
               <a:defRPr/>
             </a:pPr>
             <a:r>
-              <a:rPr lang="en-US" sz="2600" dirty="0">
+              <a:rPr lang="en-US" sz="2800" dirty="0">
                 <a:solidFill>
                   <a:prstClr val="white"/>
                 </a:solidFill>
                 <a:latin typeface="Calibri" panose="020F0502020204030204"/>
               </a:rPr>
-              <a:t>	Problem 2: Game play was broken down into multiple sub steps.</a:t>
+              <a:t>	Problem 3: Standard play was broken down into 4 coding steps.</a:t>
             </a:r>
           </a:p>
           <a:p>
@@ -13936,21 +14020,13 @@
               <a:defRPr/>
             </a:pPr>
             <a:r>
-              <a:rPr kumimoji="0" lang="en-US" sz="2600" b="0" i="0" u="none" strike="noStrike" kern="1200" cap="none" spc="0" normalizeH="0" baseline="0" noProof="0" dirty="0">
-                <a:ln>
-                  <a:noFill/>
-                </a:ln>
+              <a:rPr lang="en-US" sz="2800" dirty="0">
                 <a:solidFill>
                   <a:prstClr val="white"/>
                 </a:solidFill>
-                <a:effectLst/>
-                <a:uLnTx/>
-                <a:uFillTx/>
                 <a:latin typeface="Calibri" panose="020F0502020204030204"/>
-                <a:ea typeface="+mn-ea"/>
-                <a:cs typeface="+mn-cs"/>
               </a:rPr>
-              <a:t>		Standard Play was broken down into 4 steps</a:t>
+              <a:t>	Problem 4: War, the most complicated, was broken down into </a:t>
             </a:r>
           </a:p>
           <a:p>
@@ -13972,13 +14048,13 @@
               <a:defRPr/>
             </a:pPr>
             <a:r>
-              <a:rPr lang="en-US" sz="2600" dirty="0">
+              <a:rPr lang="en-US" sz="2800" dirty="0">
                 <a:solidFill>
                   <a:prstClr val="white"/>
                 </a:solidFill>
                 <a:latin typeface="Calibri" panose="020F0502020204030204"/>
               </a:rPr>
-              <a:t>		War was broken down into 7 steps</a:t>
+              <a:t>		         7 coding steps. </a:t>
             </a:r>
           </a:p>
           <a:p>
@@ -14000,45 +14076,67 @@
               <a:defRPr/>
             </a:pPr>
             <a:r>
-              <a:rPr kumimoji="0" lang="en-US" sz="2600" b="0" i="0" u="none" strike="noStrike" kern="1200" cap="none" spc="0" normalizeH="0" baseline="0" noProof="0" dirty="0">
-                <a:ln>
-                  <a:noFill/>
-                </a:ln>
-                <a:solidFill>
-                  <a:prstClr val="white"/>
-                </a:solidFill>
-                <a:effectLst/>
-                <a:uLnTx/>
-                <a:uFillTx/>
-                <a:latin typeface="Calibri" panose="020F0502020204030204"/>
-                <a:ea typeface="+mn-ea"/>
-                <a:cs typeface="+mn-cs"/>
-              </a:rPr>
-              <a:t>		End</a:t>
-            </a:r>
-            <a:r>
-              <a:rPr lang="en-US" sz="2600" dirty="0">
+              <a:rPr lang="en-US" sz="2800" dirty="0">
                 <a:solidFill>
                   <a:prstClr val="white"/>
                 </a:solidFill>
                 <a:latin typeface="Calibri" panose="020F0502020204030204"/>
               </a:rPr>
-              <a:t> of Game was a single step.</a:t>
-            </a:r>
-            <a:endParaRPr kumimoji="0" lang="en-US" sz="2000" b="0" i="0" u="none" strike="noStrike" kern="1200" cap="none" spc="0" normalizeH="0" baseline="0" noProof="0" dirty="0">
-              <a:ln>
-                <a:noFill/>
-              </a:ln>
+              <a:t>	Problem 2: End of game was a single coding step. </a:t>
+            </a:r>
+          </a:p>
+          <a:p>
+            <a:pPr marL="0" marR="0" lvl="0" indent="0" algn="l" defTabSz="914400" rtl="0" eaLnBrk="1" fontAlgn="auto" latinLnBrk="0" hangingPunct="1">
+              <a:lnSpc>
+                <a:spcPct val="100000"/>
+              </a:lnSpc>
+              <a:spcBef>
+                <a:spcPts val="0"/>
+              </a:spcBef>
+              <a:spcAft>
+                <a:spcPts val="0"/>
+              </a:spcAft>
+              <a:buClrTx/>
+              <a:buSzTx/>
+              <a:buFontTx/>
+              <a:buNone/>
+              <a:tabLst/>
+              <a:defRPr/>
+            </a:pPr>
+            <a:endParaRPr lang="en-US" sz="2800" dirty="0">
               <a:solidFill>
                 <a:prstClr val="white"/>
               </a:solidFill>
-              <a:effectLst/>
-              <a:uLnTx/>
-              <a:uFillTx/>
               <a:latin typeface="Calibri" panose="020F0502020204030204"/>
-              <a:ea typeface="+mn-ea"/>
-              <a:cs typeface="+mn-cs"/>
             </a:endParaRPr>
+          </a:p>
+          <a:p>
+            <a:pPr marL="0" marR="0" lvl="0" indent="0" algn="l" defTabSz="914400" rtl="0" eaLnBrk="1" fontAlgn="auto" latinLnBrk="0" hangingPunct="1">
+              <a:lnSpc>
+                <a:spcPct val="100000"/>
+              </a:lnSpc>
+              <a:spcBef>
+                <a:spcPts val="0"/>
+              </a:spcBef>
+              <a:spcAft>
+                <a:spcPts val="0"/>
+              </a:spcAft>
+              <a:buClrTx/>
+              <a:buSzTx/>
+              <a:buFontTx/>
+              <a:buNone/>
+              <a:tabLst/>
+              <a:defRPr/>
+            </a:pPr>
+            <a:r>
+              <a:rPr lang="en-US" sz="2800" dirty="0">
+                <a:solidFill>
+                  <a:prstClr val="white"/>
+                </a:solidFill>
+                <a:latin typeface="Calibri" panose="020F0502020204030204"/>
+              </a:rPr>
+              <a:t>NOTE: Problems are numbered in the order we solved them…</a:t>
+            </a:r>
           </a:p>
         </p:txBody>
       </p:sp>
@@ -14126,7 +14224,7 @@
         <p:spPr>
           <a:xfrm>
             <a:off x="624625" y="1423721"/>
-            <a:ext cx="10550556" cy="4708981"/>
+            <a:ext cx="10550556" cy="5170646"/>
           </a:xfrm>
           <a:prstGeom prst="rect">
             <a:avLst/>
@@ -14232,7 +14330,7 @@
                 <a:ea typeface="+mn-ea"/>
                 <a:cs typeface="+mn-cs"/>
               </a:rPr>
-              <a:t>The smaller problems, in many cases, can further be broken down. </a:t>
+              <a:t>The smaller problems, in many cases, can further be broken down to individual tasks. </a:t>
             </a:r>
           </a:p>
           <a:p>
@@ -14293,7 +14391,7 @@
                 <a:ea typeface="+mn-ea"/>
                 <a:cs typeface="+mn-cs"/>
               </a:rPr>
-              <a:t>Once it’s simplified enough, you can start the actual work of building your program by picking off each of the broken down problem statements to create the final program. </a:t>
+              <a:t>Once it’s simplified enough, you can start the actual work of building your program by picking off each of the broken down problems to create the program (or function). </a:t>
             </a:r>
           </a:p>
           <a:p>
@@ -14538,7 +14636,7 @@
             </a:r>
             <a:r>
               <a:rPr lang="en-US" sz="3200" dirty="0"/>
-              <a:t> is an algorithm works by recursively breaking down a problem into two or more sub-problems until these become simple enough to be solved directly. (Keep breaking the problem into smaller problems)</a:t>
+              <a:t> is an algorithm that works by recursively breaking down a problem into two or more sub-problems until these become simple enough to be solved directly. (Keep breaking the problem into smaller problems)</a:t>
             </a:r>
           </a:p>
           <a:p>
@@ -14765,7 +14863,7 @@
           <a:p>
             <a:r>
               <a:rPr lang="en-US" dirty="0"/>
-              <a:t>What we know…..</a:t>
+              <a:t>Divide and Conquer</a:t>
             </a:r>
           </a:p>
         </p:txBody>
@@ -14784,8 +14882,8 @@
         </p:nvSpPr>
         <p:spPr>
           <a:xfrm>
-            <a:off x="251138" y="1102578"/>
-            <a:ext cx="10891846" cy="5262979"/>
+            <a:off x="631065" y="1423721"/>
+            <a:ext cx="10544116" cy="5078313"/>
           </a:xfrm>
           <a:prstGeom prst="rect">
             <a:avLst/>
@@ -14798,7 +14896,7 @@
           </a:bodyPr>
           <a:lstStyle/>
           <a:p>
-            <a:pPr marL="571500" marR="0" lvl="0" indent="-571500" algn="l" defTabSz="914400" rtl="0" eaLnBrk="1" fontAlgn="auto" latinLnBrk="0" hangingPunct="1">
+            <a:pPr marL="0" marR="0" lvl="0" indent="0" algn="l" defTabSz="914400" rtl="0" eaLnBrk="1" fontAlgn="auto" latinLnBrk="0" hangingPunct="1">
               <a:lnSpc>
                 <a:spcPct val="100000"/>
               </a:lnSpc>
@@ -14810,13 +14908,13 @@
               </a:spcAft>
               <a:buClrTx/>
               <a:buSzTx/>
-              <a:buFont typeface="Arial" panose="020B0604020202020204" pitchFamily="34" charset="0"/>
-              <a:buChar char="•"/>
+              <a:buFontTx/>
+              <a:buNone/>
               <a:tabLst/>
               <a:defRPr/>
             </a:pPr>
             <a:r>
-              <a:rPr kumimoji="0" lang="en-US" sz="2800" b="0" i="0" u="none" strike="noStrike" kern="1200" cap="none" spc="0" normalizeH="0" baseline="0" noProof="0" dirty="0">
+              <a:rPr kumimoji="0" lang="en-US" sz="3600" b="0" i="0" u="none" strike="noStrike" kern="1200" cap="none" spc="0" normalizeH="0" baseline="0" noProof="0" dirty="0">
                 <a:ln>
                   <a:noFill/>
                 </a:ln>
@@ -14830,11 +14928,11 @@
                 <a:ea typeface="+mn-ea"/>
                 <a:cs typeface="+mn-cs"/>
               </a:rPr>
-              <a:t>One card deck is shuffled and split into two even piles, one for each player.</a:t>
-            </a:r>
-          </a:p>
-          <a:p>
-            <a:pPr marR="0" lvl="0" algn="l" defTabSz="914400" rtl="0" eaLnBrk="1" fontAlgn="auto" latinLnBrk="0" hangingPunct="1">
+              <a:t>There are several problems we have to tackle, so start by collecting the game rules and breaking it down to smaller steps. </a:t>
+            </a:r>
+          </a:p>
+          <a:p>
+            <a:pPr marL="0" marR="0" lvl="0" indent="0" algn="l" defTabSz="914400" rtl="0" eaLnBrk="1" fontAlgn="auto" latinLnBrk="0" hangingPunct="1">
               <a:lnSpc>
                 <a:spcPct val="100000"/>
               </a:lnSpc>
@@ -14846,10 +14944,12 @@
               </a:spcAft>
               <a:buClrTx/>
               <a:buSzTx/>
+              <a:buFontTx/>
+              <a:buNone/>
               <a:tabLst/>
               <a:defRPr/>
             </a:pPr>
-            <a:endParaRPr kumimoji="0" lang="en-US" sz="2800" b="0" i="0" u="none" strike="noStrike" kern="1200" cap="none" spc="0" normalizeH="0" baseline="0" noProof="0" dirty="0">
+            <a:endParaRPr kumimoji="0" lang="en-US" sz="3600" b="1" i="0" u="none" strike="noStrike" kern="1200" cap="all" spc="0" normalizeH="0" baseline="0" noProof="0" dirty="0">
               <a:ln>
                 <a:noFill/>
               </a:ln>
@@ -14865,12 +14965,25 @@
             </a:endParaRPr>
           </a:p>
           <a:p>
-            <a:pPr marL="571500" lvl="0" indent="-571500">
-              <a:buFont typeface="Arial" panose="020B0604020202020204" pitchFamily="34" charset="0"/>
-              <a:buChar char="•"/>
+            <a:pPr marL="0" marR="0" lvl="0" indent="0" algn="l" defTabSz="914400" rtl="0" eaLnBrk="1" fontAlgn="auto" latinLnBrk="0" hangingPunct="1">
+              <a:lnSpc>
+                <a:spcPct val="100000"/>
+              </a:lnSpc>
+              <a:spcBef>
+                <a:spcPts val="0"/>
+              </a:spcBef>
+              <a:spcAft>
+                <a:spcPts val="0"/>
+              </a:spcAft>
+              <a:buClrTx/>
+              <a:buSzTx/>
+              <a:buFontTx/>
+              <a:buNone/>
+              <a:tabLst/>
+              <a:defRPr/>
             </a:pPr>
             <a:r>
-              <a:rPr kumimoji="0" lang="en-US" sz="2800" b="0" i="0" u="none" strike="noStrike" kern="1200" cap="none" spc="0" normalizeH="0" baseline="0" noProof="0" dirty="0">
+              <a:rPr kumimoji="0" lang="en-US" sz="3600" b="1" i="0" u="none" strike="noStrike" kern="1200" cap="all" spc="0" normalizeH="0" baseline="0" noProof="0" dirty="0">
                 <a:ln>
                   <a:noFill/>
                 </a:ln>
@@ -14884,28 +14997,57 @@
                 <a:ea typeface="+mn-ea"/>
                 <a:cs typeface="+mn-cs"/>
               </a:rPr>
-              <a:t>Cards are played from the top of the player pile. </a:t>
-            </a:r>
-          </a:p>
-          <a:p>
-            <a:pPr marL="571500" lvl="0" indent="-571500">
-              <a:buFont typeface="Arial" panose="020B0604020202020204" pitchFamily="34" charset="0"/>
-              <a:buChar char="•"/>
+              <a:t>	Card Deck</a:t>
+            </a:r>
+          </a:p>
+          <a:p>
+            <a:pPr marL="0" marR="0" lvl="0" indent="0" algn="l" defTabSz="914400" rtl="0" eaLnBrk="1" fontAlgn="auto" latinLnBrk="0" hangingPunct="1">
+              <a:lnSpc>
+                <a:spcPct val="100000"/>
+              </a:lnSpc>
+              <a:spcBef>
+                <a:spcPts val="0"/>
+              </a:spcBef>
+              <a:spcAft>
+                <a:spcPts val="0"/>
+              </a:spcAft>
+              <a:buClrTx/>
+              <a:buSzTx/>
+              <a:buFontTx/>
+              <a:buNone/>
+              <a:tabLst/>
+              <a:defRPr/>
             </a:pPr>
-            <a:endParaRPr lang="en-US" sz="2800" dirty="0">
-              <a:solidFill>
-                <a:prstClr val="white"/>
-              </a:solidFill>
-              <a:latin typeface="Calibri" panose="020F0502020204030204"/>
-            </a:endParaRPr>
-          </a:p>
-          <a:p>
-            <a:pPr marL="571500" lvl="0" indent="-571500">
-              <a:buFont typeface="Arial" panose="020B0604020202020204" pitchFamily="34" charset="0"/>
-              <a:buChar char="•"/>
+            <a:r>
+              <a:rPr lang="en-US" sz="3600" b="1" cap="all" dirty="0">
+                <a:solidFill>
+                  <a:prstClr val="white"/>
+                </a:solidFill>
+                <a:latin typeface="Calibri" panose="020F0502020204030204"/>
+              </a:rPr>
+              <a:t>	Game play</a:t>
+            </a:r>
+          </a:p>
+          <a:p>
+            <a:pPr marL="0" marR="0" lvl="0" indent="0" algn="l" defTabSz="914400" rtl="0" eaLnBrk="1" fontAlgn="auto" latinLnBrk="0" hangingPunct="1">
+              <a:lnSpc>
+                <a:spcPct val="100000"/>
+              </a:lnSpc>
+              <a:spcBef>
+                <a:spcPts val="0"/>
+              </a:spcBef>
+              <a:spcAft>
+                <a:spcPts val="0"/>
+              </a:spcAft>
+              <a:buClrTx/>
+              <a:buSzTx/>
+              <a:buFontTx/>
+              <a:buNone/>
+              <a:tabLst/>
+              <a:defRPr/>
             </a:pPr>
             <a:r>
-              <a:rPr kumimoji="0" lang="en-US" sz="2800" b="0" i="0" u="none" strike="noStrike" kern="1200" cap="none" spc="0" normalizeH="0" baseline="0" noProof="0" dirty="0">
+              <a:rPr kumimoji="0" lang="en-US" sz="3600" b="1" i="0" u="none" strike="noStrike" kern="1200" cap="all" spc="0" normalizeH="0" baseline="0" noProof="0" dirty="0">
                 <a:ln>
                   <a:noFill/>
                 </a:ln>
@@ -14919,82 +15061,123 @@
                 <a:ea typeface="+mn-ea"/>
                 <a:cs typeface="+mn-cs"/>
               </a:rPr>
-              <a:t>Game play means both players turn cards over at the same time.</a:t>
-            </a:r>
-          </a:p>
-          <a:p>
-            <a:pPr marL="571500" lvl="0" indent="-571500">
-              <a:buFont typeface="Arial" panose="020B0604020202020204" pitchFamily="34" charset="0"/>
-              <a:buChar char="•"/>
-            </a:pPr>
-            <a:endParaRPr lang="en-US" sz="2800" dirty="0">
-              <a:solidFill>
-                <a:prstClr val="white"/>
-              </a:solidFill>
-              <a:latin typeface="Calibri" panose="020F0502020204030204"/>
-            </a:endParaRPr>
-          </a:p>
-          <a:p>
-            <a:pPr marL="571500" lvl="0" indent="-571500">
-              <a:buFont typeface="Arial" panose="020B0604020202020204" pitchFamily="34" charset="0"/>
-              <a:buChar char="•"/>
-            </a:pPr>
-            <a:r>
-              <a:rPr lang="en-US" sz="2800" dirty="0">
+              <a:t>		</a:t>
+            </a:r>
+            <a:r>
+              <a:rPr kumimoji="0" lang="en-US" sz="3600" b="1" i="0" u="none" strike="noStrike" kern="1200" cap="all" spc="0" normalizeH="0" baseline="0" noProof="0" dirty="0" err="1">
+                <a:ln>
+                  <a:noFill/>
+                </a:ln>
+                <a:solidFill>
+                  <a:prstClr val="white"/>
+                </a:solidFill>
+                <a:effectLst/>
+                <a:uLnTx/>
+                <a:uFillTx/>
+                <a:latin typeface="Calibri" panose="020F0502020204030204"/>
+                <a:ea typeface="+mn-ea"/>
+                <a:cs typeface="+mn-cs"/>
+              </a:rPr>
+              <a:t>sta</a:t>
+            </a:r>
+            <a:r>
+              <a:rPr lang="en-US" sz="3600" b="1" cap="all" dirty="0" err="1">
                 <a:solidFill>
                   <a:prstClr val="white"/>
                 </a:solidFill>
                 <a:latin typeface="Calibri" panose="020F0502020204030204"/>
               </a:rPr>
-              <a:t>Each round produces one winner who takes the cards at “risk”.</a:t>
-            </a:r>
-          </a:p>
-          <a:p>
-            <a:pPr marL="1028700" lvl="1" indent="-571500">
-              <a:buFont typeface="Arial" panose="020B0604020202020204" pitchFamily="34" charset="0"/>
-              <a:buChar char="•"/>
-            </a:pPr>
-            <a:r>
-              <a:rPr lang="en-US" sz="2800" dirty="0">
+              <a:t>ndard</a:t>
+            </a:r>
+            <a:r>
+              <a:rPr lang="en-US" sz="3600" b="1" cap="all" dirty="0">
                 <a:solidFill>
                   <a:prstClr val="white"/>
                 </a:solidFill>
                 <a:latin typeface="Calibri" panose="020F0502020204030204"/>
               </a:rPr>
-              <a:t>Highest card wins the match</a:t>
-            </a:r>
-          </a:p>
-          <a:p>
-            <a:pPr marL="1028700" lvl="1" indent="-571500">
-              <a:buFont typeface="Arial" panose="020B0604020202020204" pitchFamily="34" charset="0"/>
-              <a:buChar char="•"/>
+              <a:t> play</a:t>
+            </a:r>
+          </a:p>
+          <a:p>
+            <a:pPr marL="0" marR="0" lvl="0" indent="0" algn="l" defTabSz="914400" rtl="0" eaLnBrk="1" fontAlgn="auto" latinLnBrk="0" hangingPunct="1">
+              <a:lnSpc>
+                <a:spcPct val="100000"/>
+              </a:lnSpc>
+              <a:spcBef>
+                <a:spcPts val="0"/>
+              </a:spcBef>
+              <a:spcAft>
+                <a:spcPts val="0"/>
+              </a:spcAft>
+              <a:buClrTx/>
+              <a:buSzTx/>
+              <a:buFontTx/>
+              <a:buNone/>
+              <a:tabLst/>
+              <a:defRPr/>
             </a:pPr>
             <a:r>
-              <a:rPr lang="en-US" sz="2800" dirty="0">
+              <a:rPr kumimoji="0" lang="en-US" sz="3600" b="1" i="0" u="none" strike="noStrike" kern="1200" cap="all" spc="0" normalizeH="0" baseline="0" noProof="0" dirty="0">
+                <a:ln>
+                  <a:noFill/>
+                </a:ln>
+                <a:solidFill>
+                  <a:prstClr val="white"/>
+                </a:solidFill>
+                <a:effectLst/>
+                <a:uLnTx/>
+                <a:uFillTx/>
+                <a:latin typeface="Calibri" panose="020F0502020204030204"/>
+                <a:ea typeface="+mn-ea"/>
+                <a:cs typeface="+mn-cs"/>
+              </a:rPr>
+              <a:t>		</a:t>
+            </a:r>
+            <a:r>
+              <a:rPr lang="en-US" sz="3600" b="1" cap="all" dirty="0">
                 <a:solidFill>
                   <a:prstClr val="white"/>
                 </a:solidFill>
                 <a:latin typeface="Calibri" panose="020F0502020204030204"/>
               </a:rPr>
-              <a:t>A tie leads to a war.</a:t>
-            </a:r>
-            <a:endParaRPr lang="en-US" sz="2800" dirty="0"/>
-          </a:p>
-          <a:p>
-            <a:pPr marL="571500" lvl="0" indent="-571500">
-              <a:buFont typeface="Arial" panose="020B0604020202020204" pitchFamily="34" charset="0"/>
-              <a:buChar char="•"/>
+              <a:t>war</a:t>
+            </a:r>
+          </a:p>
+          <a:p>
+            <a:pPr marL="0" marR="0" lvl="0" indent="0" algn="l" defTabSz="914400" rtl="0" eaLnBrk="1" fontAlgn="auto" latinLnBrk="0" hangingPunct="1">
+              <a:lnSpc>
+                <a:spcPct val="100000"/>
+              </a:lnSpc>
+              <a:spcBef>
+                <a:spcPts val="0"/>
+              </a:spcBef>
+              <a:spcAft>
+                <a:spcPts val="0"/>
+              </a:spcAft>
+              <a:buClrTx/>
+              <a:buSzTx/>
+              <a:buFontTx/>
+              <a:buNone/>
+              <a:tabLst/>
+              <a:defRPr/>
             </a:pPr>
-            <a:endParaRPr lang="en-US" sz="2800" dirty="0"/>
-          </a:p>
-          <a:p>
-            <a:pPr marL="571500" lvl="0" indent="-571500">
-              <a:buFont typeface="Arial" panose="020B0604020202020204" pitchFamily="34" charset="0"/>
-              <a:buChar char="•"/>
-            </a:pPr>
-            <a:r>
-              <a:rPr lang="en-US" sz="2800" dirty="0"/>
-              <a:t>Game ends when one of the players has all the cards. </a:t>
+            <a:r>
+              <a:rPr kumimoji="0" lang="en-US" sz="3600" b="1" i="0" u="none" strike="noStrike" kern="1200" cap="all" spc="0" normalizeH="0" baseline="0" noProof="0" dirty="0">
+                <a:ln>
+                  <a:noFill/>
+                </a:ln>
+                <a:solidFill>
+                  <a:prstClr val="white"/>
+                </a:solidFill>
+                <a:effectLst/>
+                <a:uLnTx/>
+                <a:uFillTx/>
+                <a:latin typeface="Calibri" panose="020F0502020204030204"/>
+                <a:ea typeface="+mn-ea"/>
+                <a:cs typeface="+mn-cs"/>
+              </a:rPr>
+              <a:t>		end of game</a:t>
             </a:r>
           </a:p>
         </p:txBody>
@@ -15002,7 +15185,7 @@
     </p:spTree>
     <p:extLst>
       <p:ext uri="{BB962C8B-B14F-4D97-AF65-F5344CB8AC3E}">
-        <p14:creationId xmlns:p14="http://schemas.microsoft.com/office/powerpoint/2010/main" val="1628933036"/>
+        <p14:creationId xmlns:p14="http://schemas.microsoft.com/office/powerpoint/2010/main" val="3802288501"/>
       </p:ext>
     </p:extLst>
   </p:cSld>
@@ -15316,7 +15499,7 @@
           <a:p>
             <a:r>
               <a:rPr lang="en-US" dirty="0"/>
-              <a:t>P1: Deck Breakdown</a:t>
+              <a:t>P1: Deck Breakdown (Steps)</a:t>
             </a:r>
           </a:p>
         </p:txBody>
@@ -15379,7 +15562,7 @@
                 <a:ea typeface="+mn-ea"/>
                 <a:cs typeface="+mn-cs"/>
               </a:rPr>
-              <a:t>Now that we know what a deck is, what steps do we need to perform? (Divide and Conquer creates 3 steps)</a:t>
+              <a:t>Now that we know what a deck is, what steps do we need to perform? (Divide and Conquer creates 3 distinct coding steps)</a:t>
             </a:r>
           </a:p>
           <a:p>
@@ -15710,7 +15893,7 @@
           <a:p>
             <a:r>
               <a:rPr lang="en-US" dirty="0"/>
-              <a:t>P2: Game Play</a:t>
+              <a:t>Game Play</a:t>
             </a:r>
           </a:p>
         </p:txBody>
@@ -15773,8 +15956,39 @@
                 <a:ea typeface="+mn-ea"/>
                 <a:cs typeface="+mn-cs"/>
               </a:rPr>
-              <a:t>Now that we have figured out how to create the playing cards and distribute them to each player, we can focus on what the game play would look like. </a:t>
-            </a:r>
+              <a:t>Given that we solved the card problem, we can move on to the game play problems. </a:t>
+            </a:r>
+          </a:p>
+          <a:p>
+            <a:pPr marR="0" lvl="0" algn="l" defTabSz="914400" rtl="0" eaLnBrk="1" fontAlgn="auto" latinLnBrk="0" hangingPunct="1">
+              <a:lnSpc>
+                <a:spcPct val="100000"/>
+              </a:lnSpc>
+              <a:spcBef>
+                <a:spcPts val="0"/>
+              </a:spcBef>
+              <a:spcAft>
+                <a:spcPts val="0"/>
+              </a:spcAft>
+              <a:buClrTx/>
+              <a:buSzTx/>
+              <a:tabLst/>
+              <a:defRPr/>
+            </a:pPr>
+            <a:endParaRPr kumimoji="0" lang="en-US" sz="3200" b="0" i="0" u="none" strike="noStrike" kern="1200" cap="none" spc="0" normalizeH="0" baseline="0" noProof="0" dirty="0">
+              <a:ln>
+                <a:noFill/>
+              </a:ln>
+              <a:solidFill>
+                <a:prstClr val="white"/>
+              </a:solidFill>
+              <a:effectLst/>
+              <a:uLnTx/>
+              <a:uFillTx/>
+              <a:latin typeface="Calibri" panose="020F0502020204030204"/>
+              <a:ea typeface="+mn-ea"/>
+              <a:cs typeface="+mn-cs"/>
+            </a:endParaRPr>
           </a:p>
           <a:p>
             <a:pPr marL="571500" marR="0" lvl="0" indent="-571500" algn="l" defTabSz="914400" rtl="0" eaLnBrk="1" fontAlgn="auto" latinLnBrk="0" hangingPunct="1">
@@ -15874,7 +16088,7 @@
                 <a:ea typeface="+mn-ea"/>
                 <a:cs typeface="+mn-cs"/>
               </a:rPr>
-              <a:t>War</a:t>
+              <a:t>War (because it’s complicated, it becomes a separate issue to solve)</a:t>
             </a:r>
           </a:p>
           <a:p>
@@ -15910,7 +16124,7 @@
                 <a:ea typeface="+mn-ea"/>
                 <a:cs typeface="+mn-cs"/>
               </a:rPr>
-              <a:t>Each player flips a card, they are equal, now they turn more cards to find the winner. </a:t>
+              <a:t>Each player flips a card (standard play), they are equal, now they turn more cards to find the winner. </a:t>
             </a:r>
           </a:p>
           <a:p>
@@ -16142,7 +16356,7 @@
                 <a:ea typeface="+mn-ea"/>
                 <a:cs typeface="+mn-cs"/>
               </a:rPr>
-              <a:t>Sometimes it makes sense to look through the sub problems and pick off the easiest first. This allows you to put some structure to your code.</a:t>
+              <a:t>Sometimes it makes sense to look through the sub problems and pick off the easiest first. Logically step 2 should be standard play, but we want to first code how the game ends and allows us to start structuring our program.</a:t>
             </a:r>
           </a:p>
           <a:p>
@@ -16171,7 +16385,7 @@
             </a:endParaRPr>
           </a:p>
           <a:p>
-            <a:pPr marL="0" marR="0" lvl="0" indent="0" algn="l" defTabSz="914400" rtl="0" eaLnBrk="1" fontAlgn="auto" latinLnBrk="0" hangingPunct="1">
+            <a:pPr marL="457200" marR="0" lvl="0" indent="-457200" algn="l" defTabSz="914400" rtl="0" eaLnBrk="1" fontAlgn="auto" latinLnBrk="0" hangingPunct="1">
               <a:lnSpc>
                 <a:spcPct val="100000"/>
               </a:lnSpc>
@@ -16183,8 +16397,8 @@
               </a:spcAft>
               <a:buClrTx/>
               <a:buSzTx/>
-              <a:buFontTx/>
-              <a:buNone/>
+              <a:buFont typeface="Arial" panose="020B0604020202020204" pitchFamily="34" charset="0"/>
+              <a:buChar char="•"/>
               <a:tabLst/>
               <a:defRPr/>
             </a:pPr>
@@ -16213,7 +16427,7 @@
             </a:endParaRPr>
           </a:p>
           <a:p>
-            <a:pPr marL="0" marR="0" lvl="0" indent="0" algn="l" defTabSz="914400" rtl="0" eaLnBrk="1" fontAlgn="auto" latinLnBrk="0" hangingPunct="1">
+            <a:pPr marL="457200" marR="0" lvl="0" indent="-457200" algn="l" defTabSz="914400" rtl="0" eaLnBrk="1" fontAlgn="auto" latinLnBrk="0" hangingPunct="1">
               <a:lnSpc>
                 <a:spcPct val="100000"/>
               </a:lnSpc>
@@ -16225,41 +16439,8 @@
               </a:spcAft>
               <a:buClrTx/>
               <a:buSzTx/>
-              <a:buFontTx/>
-              <a:buNone/>
-              <a:tabLst/>
-              <a:defRPr/>
-            </a:pPr>
-            <a:endParaRPr kumimoji="0" lang="en-US" sz="3000" b="0" i="0" u="none" strike="noStrike" kern="1200" cap="none" spc="0" normalizeH="0" baseline="0" noProof="0" dirty="0">
-              <a:ln>
-                <a:noFill/>
-              </a:ln>
-              <a:solidFill>
-                <a:prstClr val="white"/>
-              </a:solidFill>
-              <a:effectLst/>
-              <a:uLnTx/>
-              <a:uFillTx/>
-              <a:latin typeface="Calibri" panose="020F0502020204030204"/>
-              <a:ea typeface="+mn-ea"/>
-              <a:cs typeface="+mn-cs"/>
-            </a:endParaRPr>
-          </a:p>
-          <a:p>
-            <a:pPr marL="0" marR="0" lvl="0" indent="0" algn="l" defTabSz="914400" rtl="0" eaLnBrk="1" fontAlgn="auto" latinLnBrk="0" hangingPunct="1">
-              <a:lnSpc>
-                <a:spcPct val="100000"/>
-              </a:lnSpc>
-              <a:spcBef>
-                <a:spcPts val="0"/>
-              </a:spcBef>
-              <a:spcAft>
-                <a:spcPts val="0"/>
-              </a:spcAft>
-              <a:buClrTx/>
-              <a:buSzTx/>
-              <a:buFontTx/>
-              <a:buNone/>
+              <a:buFont typeface="Arial" panose="020B0604020202020204" pitchFamily="34" charset="0"/>
+              <a:buChar char="•"/>
               <a:tabLst/>
               <a:defRPr/>
             </a:pPr>
@@ -16323,7 +16504,7 @@
                 </a:solidFill>
                 <a:latin typeface="Calibri" panose="020F0502020204030204"/>
               </a:rPr>
-              <a:t>while </a:t>
+              <a:t>	while </a:t>
             </a:r>
             <a:r>
               <a:rPr lang="en-US" sz="3000" dirty="0" err="1">
@@ -16387,7 +16568,7 @@
                 </a:solidFill>
                 <a:latin typeface="Calibri" panose="020F0502020204030204"/>
               </a:rPr>
-              <a:t>	# Play game…..</a:t>
+              <a:t>		# Play game…..</a:t>
             </a:r>
           </a:p>
           <a:p>
@@ -16492,7 +16673,7 @@
           <a:p>
             <a:r>
               <a:rPr lang="en-US" dirty="0"/>
-              <a:t>P2: Standard Play</a:t>
+              <a:t>P3: Standard Play</a:t>
             </a:r>
           </a:p>
         </p:txBody>
@@ -16557,7 +16738,7 @@
                 <a:ea typeface="+mn-ea"/>
                 <a:cs typeface="+mn-cs"/>
               </a:rPr>
-              <a:t>The next easiest step is Standard Play, but this gets broken down as well. Again, we need to remember we are using lists to represent each players cards:</a:t>
+              <a:t>The next simplest, and most common part of the game, is Standard Play. However, for coding tasks this gets broken down into smaller steps. </a:t>
             </a:r>
           </a:p>
           <a:p>

</xml_diff>